<commit_message>
MVP Product Backlog updated...
21/10/2021
</commit_message>
<xml_diff>
--- a/ITProjectManagement/BA/SpecsWireframes/MVP/004MVPStudentAppWireframes.pptx
+++ b/ITProjectManagement/BA/SpecsWireframes/MVP/004MVPStudentAppWireframes.pptx
@@ -219,7 +219,7 @@
           <a:p>
             <a:fld id="{26483215-80E3-4A52-98A5-4C379A79CA39}" type="datetimeFigureOut">
               <a:rPr lang="en-AU" smtClean="0"/>
-              <a:t>4/05/2021</a:t>
+              <a:t>21/10/2021</a:t>
             </a:fld>
             <a:endParaRPr lang="en-AU"/>
           </a:p>
@@ -668,7 +668,7 @@
           <a:p>
             <a:fld id="{BB2A88D7-68F7-4681-80B5-BDD492DE1B81}" type="datetimeFigureOut">
               <a:rPr lang="en-AU" smtClean="0"/>
-              <a:t>4/05/2021</a:t>
+              <a:t>21/10/2021</a:t>
             </a:fld>
             <a:endParaRPr lang="en-AU"/>
           </a:p>
@@ -838,7 +838,7 @@
           <a:p>
             <a:fld id="{BB2A88D7-68F7-4681-80B5-BDD492DE1B81}" type="datetimeFigureOut">
               <a:rPr lang="en-AU" smtClean="0"/>
-              <a:t>4/05/2021</a:t>
+              <a:t>21/10/2021</a:t>
             </a:fld>
             <a:endParaRPr lang="en-AU"/>
           </a:p>
@@ -1018,7 +1018,7 @@
           <a:p>
             <a:fld id="{BB2A88D7-68F7-4681-80B5-BDD492DE1B81}" type="datetimeFigureOut">
               <a:rPr lang="en-AU" smtClean="0"/>
-              <a:t>4/05/2021</a:t>
+              <a:t>21/10/2021</a:t>
             </a:fld>
             <a:endParaRPr lang="en-AU"/>
           </a:p>
@@ -1188,7 +1188,7 @@
           <a:p>
             <a:fld id="{BB2A88D7-68F7-4681-80B5-BDD492DE1B81}" type="datetimeFigureOut">
               <a:rPr lang="en-AU" smtClean="0"/>
-              <a:t>4/05/2021</a:t>
+              <a:t>21/10/2021</a:t>
             </a:fld>
             <a:endParaRPr lang="en-AU"/>
           </a:p>
@@ -1434,7 +1434,7 @@
           <a:p>
             <a:fld id="{BB2A88D7-68F7-4681-80B5-BDD492DE1B81}" type="datetimeFigureOut">
               <a:rPr lang="en-AU" smtClean="0"/>
-              <a:t>4/05/2021</a:t>
+              <a:t>21/10/2021</a:t>
             </a:fld>
             <a:endParaRPr lang="en-AU"/>
           </a:p>
@@ -1722,7 +1722,7 @@
           <a:p>
             <a:fld id="{BB2A88D7-68F7-4681-80B5-BDD492DE1B81}" type="datetimeFigureOut">
               <a:rPr lang="en-AU" smtClean="0"/>
-              <a:t>4/05/2021</a:t>
+              <a:t>21/10/2021</a:t>
             </a:fld>
             <a:endParaRPr lang="en-AU"/>
           </a:p>
@@ -2144,7 +2144,7 @@
           <a:p>
             <a:fld id="{BB2A88D7-68F7-4681-80B5-BDD492DE1B81}" type="datetimeFigureOut">
               <a:rPr lang="en-AU" smtClean="0"/>
-              <a:t>4/05/2021</a:t>
+              <a:t>21/10/2021</a:t>
             </a:fld>
             <a:endParaRPr lang="en-AU"/>
           </a:p>
@@ -2262,7 +2262,7 @@
           <a:p>
             <a:fld id="{BB2A88D7-68F7-4681-80B5-BDD492DE1B81}" type="datetimeFigureOut">
               <a:rPr lang="en-AU" smtClean="0"/>
-              <a:t>4/05/2021</a:t>
+              <a:t>21/10/2021</a:t>
             </a:fld>
             <a:endParaRPr lang="en-AU"/>
           </a:p>
@@ -2357,7 +2357,7 @@
           <a:p>
             <a:fld id="{BB2A88D7-68F7-4681-80B5-BDD492DE1B81}" type="datetimeFigureOut">
               <a:rPr lang="en-AU" smtClean="0"/>
-              <a:t>4/05/2021</a:t>
+              <a:t>21/10/2021</a:t>
             </a:fld>
             <a:endParaRPr lang="en-AU"/>
           </a:p>
@@ -2634,7 +2634,7 @@
           <a:p>
             <a:fld id="{BB2A88D7-68F7-4681-80B5-BDD492DE1B81}" type="datetimeFigureOut">
               <a:rPr lang="en-AU" smtClean="0"/>
-              <a:t>4/05/2021</a:t>
+              <a:t>21/10/2021</a:t>
             </a:fld>
             <a:endParaRPr lang="en-AU"/>
           </a:p>
@@ -2887,7 +2887,7 @@
           <a:p>
             <a:fld id="{BB2A88D7-68F7-4681-80B5-BDD492DE1B81}" type="datetimeFigureOut">
               <a:rPr lang="en-AU" smtClean="0"/>
-              <a:t>4/05/2021</a:t>
+              <a:t>21/10/2021</a:t>
             </a:fld>
             <a:endParaRPr lang="en-AU"/>
           </a:p>
@@ -3100,7 +3100,7 @@
           <a:p>
             <a:fld id="{BB2A88D7-68F7-4681-80B5-BDD492DE1B81}" type="datetimeFigureOut">
               <a:rPr lang="en-AU" smtClean="0"/>
-              <a:t>4/05/2021</a:t>
+              <a:t>21/10/2021</a:t>
             </a:fld>
             <a:endParaRPr lang="en-AU"/>
           </a:p>
@@ -6156,7 +6156,7 @@
       </p:sp>
       <p:pic>
         <p:nvPicPr>
-          <p:cNvPr id="2" name="Picture 1"/>
+          <p:cNvPr id="4" name="Picture 3"/>
           <p:cNvPicPr>
             <a:picLocks noChangeAspect="1"/>
           </p:cNvPicPr>
@@ -6170,8 +6170,8 @@
         </p:blipFill>
         <p:spPr>
           <a:xfrm>
-            <a:off x="228600" y="1057275"/>
-            <a:ext cx="8686800" cy="4743450"/>
+            <a:off x="228600" y="1757362"/>
+            <a:ext cx="8686800" cy="3343275"/>
           </a:xfrm>
           <a:prstGeom prst="rect">
             <a:avLst/>

</xml_diff>